<commit_message>
fix cyfi445 labs 0-3
</commit_message>
<xml_diff>
--- a/CYFI445/lectures/01_linear_regression_concept/linear_regression.pptx
+++ b/CYFI445/lectures/01_linear_regression_concept/linear_regression.pptx
@@ -131,6 +131,30 @@
 <file path=ppt/changesInfos/changesInfo1.xml><?xml version="1.0" encoding="utf-8"?>
 <pc:chgInfo xmlns:a="http://schemas.openxmlformats.org/drawingml/2006/main" xmlns:r="http://schemas.openxmlformats.org/officeDocument/2006/relationships" xmlns:ac="http://schemas.microsoft.com/office/drawing/2013/main/command" xmlns:pc="http://schemas.microsoft.com/office/powerpoint/2013/main/command">
   <pc:docChgLst>
+    <pc:chgData name="Weifeng Xu" userId="e7aed605-a3dd-4d5a-a692-a87037af107b" providerId="ADAL" clId="{F99F8FFF-BA20-43EA-924B-4DF5D2A785F3}"/>
+    <pc:docChg chg="custSel modSld">
+      <pc:chgData name="Weifeng Xu" userId="e7aed605-a3dd-4d5a-a692-a87037af107b" providerId="ADAL" clId="{F99F8FFF-BA20-43EA-924B-4DF5D2A785F3}" dt="2025-09-14T14:01:06.214" v="0" actId="313"/>
+      <pc:docMkLst>
+        <pc:docMk/>
+      </pc:docMkLst>
+      <pc:sldChg chg="modSp mod">
+        <pc:chgData name="Weifeng Xu" userId="e7aed605-a3dd-4d5a-a692-a87037af107b" providerId="ADAL" clId="{F99F8FFF-BA20-43EA-924B-4DF5D2A785F3}" dt="2025-09-14T14:01:06.214" v="0" actId="313"/>
+        <pc:sldMkLst>
+          <pc:docMk/>
+          <pc:sldMk cId="786756272" sldId="263"/>
+        </pc:sldMkLst>
+        <pc:spChg chg="mod">
+          <ac:chgData name="Weifeng Xu" userId="e7aed605-a3dd-4d5a-a692-a87037af107b" providerId="ADAL" clId="{F99F8FFF-BA20-43EA-924B-4DF5D2A785F3}" dt="2025-09-14T14:01:06.214" v="0" actId="313"/>
+          <ac:spMkLst>
+            <pc:docMk/>
+            <pc:sldMk cId="786756272" sldId="263"/>
+            <ac:spMk id="16" creationId="{6CFE6332-6366-E1F4-1531-89D785716D62}"/>
+          </ac:spMkLst>
+        </pc:spChg>
+      </pc:sldChg>
+    </pc:docChg>
+  </pc:docChgLst>
+  <pc:docChgLst>
     <pc:chgData name="Weifeng Xu" userId="e7aed605-a3dd-4d5a-a692-a87037af107b" providerId="ADAL" clId="{9C06CBEB-0343-4287-8B81-0C702673DE5E}"/>
     <pc:docChg chg="undo redo custSel addSld delSld modSld sldOrd">
       <pc:chgData name="Weifeng Xu" userId="e7aed605-a3dd-4d5a-a692-a87037af107b" providerId="ADAL" clId="{9C06CBEB-0343-4287-8B81-0C702673DE5E}" dt="2025-05-15T00:31:37.291" v="4738" actId="20577"/>
@@ -143,14 +167,6 @@
           <pc:docMk/>
           <pc:sldMk cId="1325061211" sldId="256"/>
         </pc:sldMkLst>
-        <pc:spChg chg="mod">
-          <ac:chgData name="Weifeng Xu" userId="e7aed605-a3dd-4d5a-a692-a87037af107b" providerId="ADAL" clId="{9C06CBEB-0343-4287-8B81-0C702673DE5E}" dt="2025-05-15T00:31:37.291" v="4738" actId="20577"/>
-          <ac:spMkLst>
-            <pc:docMk/>
-            <pc:sldMk cId="1325061211" sldId="256"/>
-            <ac:spMk id="2" creationId="{00000000-0000-0000-0000-000000000000}"/>
-          </ac:spMkLst>
-        </pc:spChg>
       </pc:sldChg>
       <pc:sldChg chg="addSp delSp modSp del mod modClrScheme chgLayout">
         <pc:chgData name="Weifeng Xu" userId="e7aed605-a3dd-4d5a-a692-a87037af107b" providerId="ADAL" clId="{9C06CBEB-0343-4287-8B81-0C702673DE5E}" dt="2025-04-26T15:27:36.375" v="4556" actId="47"/>
@@ -186,54 +202,6 @@
           <pc:docMk/>
           <pc:sldMk cId="1030786537" sldId="261"/>
         </pc:sldMkLst>
-        <pc:spChg chg="add mod ord">
-          <ac:chgData name="Weifeng Xu" userId="e7aed605-a3dd-4d5a-a692-a87037af107b" providerId="ADAL" clId="{9C06CBEB-0343-4287-8B81-0C702673DE5E}" dt="2025-04-20T22:01:49.301" v="1392" actId="20577"/>
-          <ac:spMkLst>
-            <pc:docMk/>
-            <pc:sldMk cId="1030786537" sldId="261"/>
-            <ac:spMk id="3" creationId="{81DCB269-1203-1D2D-9E99-D3B48C46B194}"/>
-          </ac:spMkLst>
-        </pc:spChg>
-        <pc:spChg chg="add mod">
-          <ac:chgData name="Weifeng Xu" userId="e7aed605-a3dd-4d5a-a692-a87037af107b" providerId="ADAL" clId="{9C06CBEB-0343-4287-8B81-0C702673DE5E}" dt="2025-04-26T19:29:37.985" v="4686" actId="207"/>
-          <ac:spMkLst>
-            <pc:docMk/>
-            <pc:sldMk cId="1030786537" sldId="261"/>
-            <ac:spMk id="13" creationId="{8ADAE649-F020-B6B2-BDF7-7228B8323408}"/>
-          </ac:spMkLst>
-        </pc:spChg>
-        <pc:graphicFrameChg chg="add mod modGraphic">
-          <ac:chgData name="Weifeng Xu" userId="e7aed605-a3dd-4d5a-a692-a87037af107b" providerId="ADAL" clId="{9C06CBEB-0343-4287-8B81-0C702673DE5E}" dt="2025-04-26T19:28:08.254" v="4635" actId="6549"/>
-          <ac:graphicFrameMkLst>
-            <pc:docMk/>
-            <pc:sldMk cId="1030786537" sldId="261"/>
-            <ac:graphicFrameMk id="2" creationId="{B808FA30-DCC3-2879-42EB-A487CBB0C49A}"/>
-          </ac:graphicFrameMkLst>
-        </pc:graphicFrameChg>
-        <pc:picChg chg="add mod">
-          <ac:chgData name="Weifeng Xu" userId="e7aed605-a3dd-4d5a-a692-a87037af107b" providerId="ADAL" clId="{9C06CBEB-0343-4287-8B81-0C702673DE5E}" dt="2025-04-20T22:57:06.886" v="1470" actId="14100"/>
-          <ac:picMkLst>
-            <pc:docMk/>
-            <pc:sldMk cId="1030786537" sldId="261"/>
-            <ac:picMk id="5" creationId="{5F7F7FF6-3932-3B34-DF55-20F49B6C5DC6}"/>
-          </ac:picMkLst>
-        </pc:picChg>
-        <pc:picChg chg="add mod">
-          <ac:chgData name="Weifeng Xu" userId="e7aed605-a3dd-4d5a-a692-a87037af107b" providerId="ADAL" clId="{9C06CBEB-0343-4287-8B81-0C702673DE5E}" dt="2025-04-20T22:37:51.033" v="1456" actId="14100"/>
-          <ac:picMkLst>
-            <pc:docMk/>
-            <pc:sldMk cId="1030786537" sldId="261"/>
-            <ac:picMk id="7" creationId="{BAAF111E-92E4-5750-48AA-EE070F60BC97}"/>
-          </ac:picMkLst>
-        </pc:picChg>
-        <pc:picChg chg="add mod">
-          <ac:chgData name="Weifeng Xu" userId="e7aed605-a3dd-4d5a-a692-a87037af107b" providerId="ADAL" clId="{9C06CBEB-0343-4287-8B81-0C702673DE5E}" dt="2025-04-20T22:57:08.806" v="1471" actId="1076"/>
-          <ac:picMkLst>
-            <pc:docMk/>
-            <pc:sldMk cId="1030786537" sldId="261"/>
-            <ac:picMk id="11" creationId="{76C81A08-5219-3C77-9B62-9703EEDE01B4}"/>
-          </ac:picMkLst>
-        </pc:picChg>
       </pc:sldChg>
       <pc:sldChg chg="addSp delSp modSp new mod">
         <pc:chgData name="Weifeng Xu" userId="e7aed605-a3dd-4d5a-a692-a87037af107b" providerId="ADAL" clId="{9C06CBEB-0343-4287-8B81-0C702673DE5E}" dt="2025-04-26T19:31:34.426" v="4725" actId="207"/>
@@ -241,238 +209,6 @@
           <pc:docMk/>
           <pc:sldMk cId="3284022864" sldId="262"/>
         </pc:sldMkLst>
-        <pc:spChg chg="mod">
-          <ac:chgData name="Weifeng Xu" userId="e7aed605-a3dd-4d5a-a692-a87037af107b" providerId="ADAL" clId="{9C06CBEB-0343-4287-8B81-0C702673DE5E}" dt="2025-04-23T00:36:22.083" v="3996" actId="20577"/>
-          <ac:spMkLst>
-            <pc:docMk/>
-            <pc:sldMk cId="3284022864" sldId="262"/>
-            <ac:spMk id="2" creationId="{3545F1D4-75D9-B2B8-030F-5F202F5E9893}"/>
-          </ac:spMkLst>
-        </pc:spChg>
-        <pc:spChg chg="add mod">
-          <ac:chgData name="Weifeng Xu" userId="e7aed605-a3dd-4d5a-a692-a87037af107b" providerId="ADAL" clId="{9C06CBEB-0343-4287-8B81-0C702673DE5E}" dt="2025-04-26T19:31:34.426" v="4725" actId="207"/>
-          <ac:spMkLst>
-            <pc:docMk/>
-            <pc:sldMk cId="3284022864" sldId="262"/>
-            <ac:spMk id="6" creationId="{28AAF78A-7B20-D4EF-2369-85B43DBD5A1C}"/>
-          </ac:spMkLst>
-        </pc:spChg>
-        <pc:spChg chg="add mod">
-          <ac:chgData name="Weifeng Xu" userId="e7aed605-a3dd-4d5a-a692-a87037af107b" providerId="ADAL" clId="{9C06CBEB-0343-4287-8B81-0C702673DE5E}" dt="2025-04-21T13:32:48.968" v="2014" actId="20577"/>
-          <ac:spMkLst>
-            <pc:docMk/>
-            <pc:sldMk cId="3284022864" sldId="262"/>
-            <ac:spMk id="28" creationId="{929FB331-FAEF-20F2-D70B-1FA4A07B3E10}"/>
-          </ac:spMkLst>
-        </pc:spChg>
-        <pc:spChg chg="add mod">
-          <ac:chgData name="Weifeng Xu" userId="e7aed605-a3dd-4d5a-a692-a87037af107b" providerId="ADAL" clId="{9C06CBEB-0343-4287-8B81-0C702673DE5E}" dt="2025-04-21T01:46:51.630" v="1802" actId="1076"/>
-          <ac:spMkLst>
-            <pc:docMk/>
-            <pc:sldMk cId="3284022864" sldId="262"/>
-            <ac:spMk id="29" creationId="{726E495F-E51E-7625-45D5-4B507E26B130}"/>
-          </ac:spMkLst>
-        </pc:spChg>
-        <pc:spChg chg="add mod">
-          <ac:chgData name="Weifeng Xu" userId="e7aed605-a3dd-4d5a-a692-a87037af107b" providerId="ADAL" clId="{9C06CBEB-0343-4287-8B81-0C702673DE5E}" dt="2025-04-21T01:46:51.630" v="1802" actId="1076"/>
-          <ac:spMkLst>
-            <pc:docMk/>
-            <pc:sldMk cId="3284022864" sldId="262"/>
-            <ac:spMk id="34" creationId="{173C3907-94C0-DA12-7E19-0F64DCE12DB3}"/>
-          </ac:spMkLst>
-        </pc:spChg>
-        <pc:spChg chg="add mod">
-          <ac:chgData name="Weifeng Xu" userId="e7aed605-a3dd-4d5a-a692-a87037af107b" providerId="ADAL" clId="{9C06CBEB-0343-4287-8B81-0C702673DE5E}" dt="2025-04-21T01:46:51.630" v="1802" actId="1076"/>
-          <ac:spMkLst>
-            <pc:docMk/>
-            <pc:sldMk cId="3284022864" sldId="262"/>
-            <ac:spMk id="35" creationId="{55C56940-359D-14E2-18C8-338471DBFC37}"/>
-          </ac:spMkLst>
-        </pc:spChg>
-        <pc:spChg chg="add mod">
-          <ac:chgData name="Weifeng Xu" userId="e7aed605-a3dd-4d5a-a692-a87037af107b" providerId="ADAL" clId="{9C06CBEB-0343-4287-8B81-0C702673DE5E}" dt="2025-04-21T01:46:51.630" v="1802" actId="1076"/>
-          <ac:spMkLst>
-            <pc:docMk/>
-            <pc:sldMk cId="3284022864" sldId="262"/>
-            <ac:spMk id="36" creationId="{C6E4F162-DF00-B63F-DB79-B734D59C6845}"/>
-          </ac:spMkLst>
-        </pc:spChg>
-        <pc:spChg chg="add mod">
-          <ac:chgData name="Weifeng Xu" userId="e7aed605-a3dd-4d5a-a692-a87037af107b" providerId="ADAL" clId="{9C06CBEB-0343-4287-8B81-0C702673DE5E}" dt="2025-04-21T13:36:01.041" v="2041" actId="14100"/>
-          <ac:spMkLst>
-            <pc:docMk/>
-            <pc:sldMk cId="3284022864" sldId="262"/>
-            <ac:spMk id="37" creationId="{954A9C7A-5333-C02A-1903-CA09A80ED1ED}"/>
-          </ac:spMkLst>
-        </pc:spChg>
-        <pc:spChg chg="add mod">
-          <ac:chgData name="Weifeng Xu" userId="e7aed605-a3dd-4d5a-a692-a87037af107b" providerId="ADAL" clId="{9C06CBEB-0343-4287-8B81-0C702673DE5E}" dt="2025-04-21T01:56:46.855" v="1882" actId="1076"/>
-          <ac:spMkLst>
-            <pc:docMk/>
-            <pc:sldMk cId="3284022864" sldId="262"/>
-            <ac:spMk id="38" creationId="{CE6303E5-8AC2-D65A-075D-49F56EF3337C}"/>
-          </ac:spMkLst>
-        </pc:spChg>
-        <pc:spChg chg="add mod">
-          <ac:chgData name="Weifeng Xu" userId="e7aed605-a3dd-4d5a-a692-a87037af107b" providerId="ADAL" clId="{9C06CBEB-0343-4287-8B81-0C702673DE5E}" dt="2025-04-21T01:57:08.633" v="1897" actId="6549"/>
-          <ac:spMkLst>
-            <pc:docMk/>
-            <pc:sldMk cId="3284022864" sldId="262"/>
-            <ac:spMk id="39" creationId="{C8BEE139-0ECC-6E9C-B728-598F4B7B3453}"/>
-          </ac:spMkLst>
-        </pc:spChg>
-        <pc:grpChg chg="mod">
-          <ac:chgData name="Weifeng Xu" userId="e7aed605-a3dd-4d5a-a692-a87037af107b" providerId="ADAL" clId="{9C06CBEB-0343-4287-8B81-0C702673DE5E}" dt="2025-04-20T23:53:28.129" v="1689"/>
-          <ac:grpSpMkLst>
-            <pc:docMk/>
-            <pc:sldMk cId="3284022864" sldId="262"/>
-            <ac:grpSpMk id="32" creationId="{019FDE0A-49E8-E30F-BF0F-08CA8B695A32}"/>
-          </ac:grpSpMkLst>
-        </pc:grpChg>
-        <pc:picChg chg="add mod">
-          <ac:chgData name="Weifeng Xu" userId="e7aed605-a3dd-4d5a-a692-a87037af107b" providerId="ADAL" clId="{9C06CBEB-0343-4287-8B81-0C702673DE5E}" dt="2025-04-21T01:46:51.630" v="1802" actId="1076"/>
-          <ac:picMkLst>
-            <pc:docMk/>
-            <pc:sldMk cId="3284022864" sldId="262"/>
-            <ac:picMk id="3" creationId="{4D55F9BB-184C-70D3-7F78-B94F1107A39F}"/>
-          </ac:picMkLst>
-        </pc:picChg>
-        <pc:picChg chg="add mod">
-          <ac:chgData name="Weifeng Xu" userId="e7aed605-a3dd-4d5a-a692-a87037af107b" providerId="ADAL" clId="{9C06CBEB-0343-4287-8B81-0C702673DE5E}" dt="2025-04-21T01:46:51.630" v="1802" actId="1076"/>
-          <ac:picMkLst>
-            <pc:docMk/>
-            <pc:sldMk cId="3284022864" sldId="262"/>
-            <ac:picMk id="4" creationId="{7FE2597E-1527-152E-4B36-3116D20876DE}"/>
-          </ac:picMkLst>
-        </pc:picChg>
-        <pc:picChg chg="add mod">
-          <ac:chgData name="Weifeng Xu" userId="e7aed605-a3dd-4d5a-a692-a87037af107b" providerId="ADAL" clId="{9C06CBEB-0343-4287-8B81-0C702673DE5E}" dt="2025-04-21T01:46:51.630" v="1802" actId="1076"/>
-          <ac:picMkLst>
-            <pc:docMk/>
-            <pc:sldMk cId="3284022864" sldId="262"/>
-            <ac:picMk id="5" creationId="{9B21C46A-436F-8792-C5EC-25DAD8867E7B}"/>
-          </ac:picMkLst>
-        </pc:picChg>
-        <pc:inkChg chg="add mod">
-          <ac:chgData name="Weifeng Xu" userId="e7aed605-a3dd-4d5a-a692-a87037af107b" providerId="ADAL" clId="{9C06CBEB-0343-4287-8B81-0C702673DE5E}" dt="2025-04-20T23:49:49.040" v="1638" actId="1076"/>
-          <ac:inkMkLst>
-            <pc:docMk/>
-            <pc:sldMk cId="3284022864" sldId="262"/>
-            <ac:inkMk id="7" creationId="{3F4193B4-F917-3F96-9FEC-F6ECD6AE8441}"/>
-          </ac:inkMkLst>
-        </pc:inkChg>
-        <pc:inkChg chg="add mod">
-          <ac:chgData name="Weifeng Xu" userId="e7aed605-a3dd-4d5a-a692-a87037af107b" providerId="ADAL" clId="{9C06CBEB-0343-4287-8B81-0C702673DE5E}" dt="2025-04-20T23:49:49.040" v="1638" actId="1076"/>
-          <ac:inkMkLst>
-            <pc:docMk/>
-            <pc:sldMk cId="3284022864" sldId="262"/>
-            <ac:inkMk id="11" creationId="{936BF0D1-A0D4-D5DA-E406-4E5653EA0710}"/>
-          </ac:inkMkLst>
-        </pc:inkChg>
-        <pc:inkChg chg="add">
-          <ac:chgData name="Weifeng Xu" userId="e7aed605-a3dd-4d5a-a692-a87037af107b" providerId="ADAL" clId="{9C06CBEB-0343-4287-8B81-0C702673DE5E}" dt="2025-04-20T23:45:03.667" v="1489"/>
-          <ac:inkMkLst>
-            <pc:docMk/>
-            <pc:sldMk cId="3284022864" sldId="262"/>
-            <ac:inkMk id="13" creationId="{2DAEBB26-4479-5E5D-9F96-B18C83149340}"/>
-          </ac:inkMkLst>
-        </pc:inkChg>
-        <pc:inkChg chg="add">
-          <ac:chgData name="Weifeng Xu" userId="e7aed605-a3dd-4d5a-a692-a87037af107b" providerId="ADAL" clId="{9C06CBEB-0343-4287-8B81-0C702673DE5E}" dt="2025-04-20T23:45:12.505" v="1492" actId="9405"/>
-          <ac:inkMkLst>
-            <pc:docMk/>
-            <pc:sldMk cId="3284022864" sldId="262"/>
-            <ac:inkMk id="15" creationId="{C9407239-E942-8B82-59A4-3A29ECA6B77D}"/>
-          </ac:inkMkLst>
-        </pc:inkChg>
-        <pc:inkChg chg="add mod">
-          <ac:chgData name="Weifeng Xu" userId="e7aed605-a3dd-4d5a-a692-a87037af107b" providerId="ADAL" clId="{9C06CBEB-0343-4287-8B81-0C702673DE5E}" dt="2025-04-20T23:49:49.040" v="1638" actId="1076"/>
-          <ac:inkMkLst>
-            <pc:docMk/>
-            <pc:sldMk cId="3284022864" sldId="262"/>
-            <ac:inkMk id="16" creationId="{433A662E-717E-BD2E-2C7C-AB6E614FDD3F}"/>
-          </ac:inkMkLst>
-        </pc:inkChg>
-        <pc:inkChg chg="add mod">
-          <ac:chgData name="Weifeng Xu" userId="e7aed605-a3dd-4d5a-a692-a87037af107b" providerId="ADAL" clId="{9C06CBEB-0343-4287-8B81-0C702673DE5E}" dt="2025-04-20T23:49:49.040" v="1638" actId="1076"/>
-          <ac:inkMkLst>
-            <pc:docMk/>
-            <pc:sldMk cId="3284022864" sldId="262"/>
-            <ac:inkMk id="17" creationId="{BFCD2773-6115-F8F1-1402-5ABDCC3BA65F}"/>
-          </ac:inkMkLst>
-        </pc:inkChg>
-        <pc:inkChg chg="add">
-          <ac:chgData name="Weifeng Xu" userId="e7aed605-a3dd-4d5a-a692-a87037af107b" providerId="ADAL" clId="{9C06CBEB-0343-4287-8B81-0C702673DE5E}" dt="2025-04-20T23:45:18.051" v="1495" actId="9405"/>
-          <ac:inkMkLst>
-            <pc:docMk/>
-            <pc:sldMk cId="3284022864" sldId="262"/>
-            <ac:inkMk id="18" creationId="{9A00C1B2-F0C9-A689-873D-40CD755E2BF6}"/>
-          </ac:inkMkLst>
-        </pc:inkChg>
-        <pc:inkChg chg="add mod">
-          <ac:chgData name="Weifeng Xu" userId="e7aed605-a3dd-4d5a-a692-a87037af107b" providerId="ADAL" clId="{9C06CBEB-0343-4287-8B81-0C702673DE5E}" dt="2025-04-20T23:49:49.040" v="1638" actId="1076"/>
-          <ac:inkMkLst>
-            <pc:docMk/>
-            <pc:sldMk cId="3284022864" sldId="262"/>
-            <ac:inkMk id="19" creationId="{951743CD-297A-73CC-D868-69D272B1A979}"/>
-          </ac:inkMkLst>
-        </pc:inkChg>
-        <pc:inkChg chg="add">
-          <ac:chgData name="Weifeng Xu" userId="e7aed605-a3dd-4d5a-a692-a87037af107b" providerId="ADAL" clId="{9C06CBEB-0343-4287-8B81-0C702673DE5E}" dt="2025-04-20T23:45:28.907" v="1499" actId="9405"/>
-          <ac:inkMkLst>
-            <pc:docMk/>
-            <pc:sldMk cId="3284022864" sldId="262"/>
-            <ac:inkMk id="21" creationId="{C6425DC8-BD39-A8F1-D08B-5B10CD502874}"/>
-          </ac:inkMkLst>
-        </pc:inkChg>
-        <pc:inkChg chg="add">
-          <ac:chgData name="Weifeng Xu" userId="e7aed605-a3dd-4d5a-a692-a87037af107b" providerId="ADAL" clId="{9C06CBEB-0343-4287-8B81-0C702673DE5E}" dt="2025-04-20T23:45:31.283" v="1500" actId="9405"/>
-          <ac:inkMkLst>
-            <pc:docMk/>
-            <pc:sldMk cId="3284022864" sldId="262"/>
-            <ac:inkMk id="22" creationId="{E4A7EF01-A95B-57C1-EE21-E005B47466C9}"/>
-          </ac:inkMkLst>
-        </pc:inkChg>
-        <pc:inkChg chg="add mod">
-          <ac:chgData name="Weifeng Xu" userId="e7aed605-a3dd-4d5a-a692-a87037af107b" providerId="ADAL" clId="{9C06CBEB-0343-4287-8B81-0C702673DE5E}" dt="2025-04-20T23:49:49.040" v="1638" actId="1076"/>
-          <ac:inkMkLst>
-            <pc:docMk/>
-            <pc:sldMk cId="3284022864" sldId="262"/>
-            <ac:inkMk id="26" creationId="{C329BFB3-D9C9-AD21-E6C5-E9AC6EABA7AB}"/>
-          </ac:inkMkLst>
-        </pc:inkChg>
-        <pc:inkChg chg="add mod">
-          <ac:chgData name="Weifeng Xu" userId="e7aed605-a3dd-4d5a-a692-a87037af107b" providerId="ADAL" clId="{9C06CBEB-0343-4287-8B81-0C702673DE5E}" dt="2025-04-20T23:49:49.040" v="1638" actId="1076"/>
-          <ac:inkMkLst>
-            <pc:docMk/>
-            <pc:sldMk cId="3284022864" sldId="262"/>
-            <ac:inkMk id="27" creationId="{967D2347-2DE8-03E2-B756-9D59F0B382C4}"/>
-          </ac:inkMkLst>
-        </pc:inkChg>
-        <pc:inkChg chg="add mod">
-          <ac:chgData name="Weifeng Xu" userId="e7aed605-a3dd-4d5a-a692-a87037af107b" providerId="ADAL" clId="{9C06CBEB-0343-4287-8B81-0C702673DE5E}" dt="2025-04-20T23:53:28.129" v="1689"/>
-          <ac:inkMkLst>
-            <pc:docMk/>
-            <pc:sldMk cId="3284022864" sldId="262"/>
-            <ac:inkMk id="30" creationId="{E08757D0-633A-94F4-8D8B-15C1B2C42F35}"/>
-          </ac:inkMkLst>
-        </pc:inkChg>
-        <pc:inkChg chg="add mod">
-          <ac:chgData name="Weifeng Xu" userId="e7aed605-a3dd-4d5a-a692-a87037af107b" providerId="ADAL" clId="{9C06CBEB-0343-4287-8B81-0C702673DE5E}" dt="2025-04-20T23:53:28.129" v="1689"/>
-          <ac:inkMkLst>
-            <pc:docMk/>
-            <pc:sldMk cId="3284022864" sldId="262"/>
-            <ac:inkMk id="31" creationId="{442F2665-D702-9D1E-068C-5A972DEA6C47}"/>
-          </ac:inkMkLst>
-        </pc:inkChg>
-        <pc:inkChg chg="add">
-          <ac:chgData name="Weifeng Xu" userId="e7aed605-a3dd-4d5a-a692-a87037af107b" providerId="ADAL" clId="{9C06CBEB-0343-4287-8B81-0C702673DE5E}" dt="2025-04-20T23:56:08.905" v="1724" actId="9405"/>
-          <ac:inkMkLst>
-            <pc:docMk/>
-            <pc:sldMk cId="3284022864" sldId="262"/>
-            <ac:inkMk id="33" creationId="{B2F3EA29-B89E-90E2-8CF7-CBAC1F163CF6}"/>
-          </ac:inkMkLst>
-        </pc:inkChg>
       </pc:sldChg>
       <pc:sldChg chg="addSp delSp modSp new mod">
         <pc:chgData name="Weifeng Xu" userId="e7aed605-a3dd-4d5a-a692-a87037af107b" providerId="ADAL" clId="{9C06CBEB-0343-4287-8B81-0C702673DE5E}" dt="2025-04-26T19:24:01.218" v="4627" actId="1076"/>
@@ -480,126 +216,6 @@
           <pc:docMk/>
           <pc:sldMk cId="786756272" sldId="263"/>
         </pc:sldMkLst>
-        <pc:spChg chg="mod">
-          <ac:chgData name="Weifeng Xu" userId="e7aed605-a3dd-4d5a-a692-a87037af107b" providerId="ADAL" clId="{9C06CBEB-0343-4287-8B81-0C702673DE5E}" dt="2025-04-21T13:35:38.175" v="2036" actId="20577"/>
-          <ac:spMkLst>
-            <pc:docMk/>
-            <pc:sldMk cId="786756272" sldId="263"/>
-            <ac:spMk id="2" creationId="{129CE8B6-E58C-C109-A56B-478DAC216297}"/>
-          </ac:spMkLst>
-        </pc:spChg>
-        <pc:spChg chg="add mod">
-          <ac:chgData name="Weifeng Xu" userId="e7aed605-a3dd-4d5a-a692-a87037af107b" providerId="ADAL" clId="{9C06CBEB-0343-4287-8B81-0C702673DE5E}" dt="2025-04-21T01:53:52.417" v="1850" actId="14100"/>
-          <ac:spMkLst>
-            <pc:docMk/>
-            <pc:sldMk cId="786756272" sldId="263"/>
-            <ac:spMk id="8" creationId="{4BE57C66-7E32-424D-74E8-BA49432944ED}"/>
-          </ac:spMkLst>
-        </pc:spChg>
-        <pc:spChg chg="add mod">
-          <ac:chgData name="Weifeng Xu" userId="e7aed605-a3dd-4d5a-a692-a87037af107b" providerId="ADAL" clId="{9C06CBEB-0343-4287-8B81-0C702673DE5E}" dt="2025-04-21T01:53:52.417" v="1850" actId="14100"/>
-          <ac:spMkLst>
-            <pc:docMk/>
-            <pc:sldMk cId="786756272" sldId="263"/>
-            <ac:spMk id="13" creationId="{58DF8A4F-CE98-07F6-B3E9-41CE8F16F4DD}"/>
-          </ac:spMkLst>
-        </pc:spChg>
-        <pc:spChg chg="add mod">
-          <ac:chgData name="Weifeng Xu" userId="e7aed605-a3dd-4d5a-a692-a87037af107b" providerId="ADAL" clId="{9C06CBEB-0343-4287-8B81-0C702673DE5E}" dt="2025-04-23T00:40:19.679" v="4005" actId="6549"/>
-          <ac:spMkLst>
-            <pc:docMk/>
-            <pc:sldMk cId="786756272" sldId="263"/>
-            <ac:spMk id="16" creationId="{6CFE6332-6366-E1F4-1531-89D785716D62}"/>
-          </ac:spMkLst>
-        </pc:spChg>
-        <pc:grpChg chg="add mod">
-          <ac:chgData name="Weifeng Xu" userId="e7aed605-a3dd-4d5a-a692-a87037af107b" providerId="ADAL" clId="{9C06CBEB-0343-4287-8B81-0C702673DE5E}" dt="2025-04-21T01:53:52.417" v="1850" actId="14100"/>
-          <ac:grpSpMkLst>
-            <pc:docMk/>
-            <pc:sldMk cId="786756272" sldId="263"/>
-            <ac:grpSpMk id="9" creationId="{B38C77F7-D4A7-4352-BB61-CCB4290C341F}"/>
-          </ac:grpSpMkLst>
-        </pc:grpChg>
-        <pc:picChg chg="add mod">
-          <ac:chgData name="Weifeng Xu" userId="e7aed605-a3dd-4d5a-a692-a87037af107b" providerId="ADAL" clId="{9C06CBEB-0343-4287-8B81-0C702673DE5E}" dt="2025-04-21T01:53:52.417" v="1850" actId="14100"/>
-          <ac:picMkLst>
-            <pc:docMk/>
-            <pc:sldMk cId="786756272" sldId="263"/>
-            <ac:picMk id="3" creationId="{4A3ADA9B-B9A2-7E2E-65CE-76B038CB3D63}"/>
-          </ac:picMkLst>
-        </pc:picChg>
-        <pc:picChg chg="add mod">
-          <ac:chgData name="Weifeng Xu" userId="e7aed605-a3dd-4d5a-a692-a87037af107b" providerId="ADAL" clId="{9C06CBEB-0343-4287-8B81-0C702673DE5E}" dt="2025-04-26T19:23:49.293" v="4625" actId="1076"/>
-          <ac:picMkLst>
-            <pc:docMk/>
-            <pc:sldMk cId="786756272" sldId="263"/>
-            <ac:picMk id="15" creationId="{31D0306C-0550-5D51-6D5C-47DDD7008CB4}"/>
-          </ac:picMkLst>
-        </pc:picChg>
-        <pc:picChg chg="add mod">
-          <ac:chgData name="Weifeng Xu" userId="e7aed605-a3dd-4d5a-a692-a87037af107b" providerId="ADAL" clId="{9C06CBEB-0343-4287-8B81-0C702673DE5E}" dt="2025-04-26T19:24:01.218" v="4627" actId="1076"/>
-          <ac:picMkLst>
-            <pc:docMk/>
-            <pc:sldMk cId="786756272" sldId="263"/>
-            <ac:picMk id="18" creationId="{8F41AE93-AC01-ADAB-7B39-7B935316617F}"/>
-          </ac:picMkLst>
-        </pc:picChg>
-        <pc:inkChg chg="add mod">
-          <ac:chgData name="Weifeng Xu" userId="e7aed605-a3dd-4d5a-a692-a87037af107b" providerId="ADAL" clId="{9C06CBEB-0343-4287-8B81-0C702673DE5E}" dt="2025-04-21T01:53:52.417" v="1850" actId="14100"/>
-          <ac:inkMkLst>
-            <pc:docMk/>
-            <pc:sldMk cId="786756272" sldId="263"/>
-            <ac:inkMk id="4" creationId="{C62AB7B7-DB0F-EA17-FB84-0B8622E0B18A}"/>
-          </ac:inkMkLst>
-        </pc:inkChg>
-        <pc:inkChg chg="add mod">
-          <ac:chgData name="Weifeng Xu" userId="e7aed605-a3dd-4d5a-a692-a87037af107b" providerId="ADAL" clId="{9C06CBEB-0343-4287-8B81-0C702673DE5E}" dt="2025-04-21T01:53:52.417" v="1850" actId="14100"/>
-          <ac:inkMkLst>
-            <pc:docMk/>
-            <pc:sldMk cId="786756272" sldId="263"/>
-            <ac:inkMk id="5" creationId="{46F3B520-93C4-47B1-A435-BCA55AFF498D}"/>
-          </ac:inkMkLst>
-        </pc:inkChg>
-        <pc:inkChg chg="mod">
-          <ac:chgData name="Weifeng Xu" userId="e7aed605-a3dd-4d5a-a692-a87037af107b" providerId="ADAL" clId="{9C06CBEB-0343-4287-8B81-0C702673DE5E}" dt="2025-04-21T01:53:52.417" v="1850" actId="14100"/>
-          <ac:inkMkLst>
-            <pc:docMk/>
-            <pc:sldMk cId="786756272" sldId="263"/>
-            <ac:inkMk id="6" creationId="{A7126D34-5186-10A2-650F-365C3E4EFAD2}"/>
-          </ac:inkMkLst>
-        </pc:inkChg>
-        <pc:inkChg chg="add mod">
-          <ac:chgData name="Weifeng Xu" userId="e7aed605-a3dd-4d5a-a692-a87037af107b" providerId="ADAL" clId="{9C06CBEB-0343-4287-8B81-0C702673DE5E}" dt="2025-04-21T01:53:52.417" v="1850" actId="14100"/>
-          <ac:inkMkLst>
-            <pc:docMk/>
-            <pc:sldMk cId="786756272" sldId="263"/>
-            <ac:inkMk id="7" creationId="{907A70E4-6C88-158C-A534-69539F5F8B97}"/>
-          </ac:inkMkLst>
-        </pc:inkChg>
-        <pc:inkChg chg="mod">
-          <ac:chgData name="Weifeng Xu" userId="e7aed605-a3dd-4d5a-a692-a87037af107b" providerId="ADAL" clId="{9C06CBEB-0343-4287-8B81-0C702673DE5E}" dt="2025-04-21T01:51:55.040" v="1819"/>
-          <ac:inkMkLst>
-            <pc:docMk/>
-            <pc:sldMk cId="786756272" sldId="263"/>
-            <ac:inkMk id="10" creationId="{6684FF24-A6CE-B4E7-D13F-74C1E9C1FCAA}"/>
-          </ac:inkMkLst>
-        </pc:inkChg>
-        <pc:inkChg chg="mod">
-          <ac:chgData name="Weifeng Xu" userId="e7aed605-a3dd-4d5a-a692-a87037af107b" providerId="ADAL" clId="{9C06CBEB-0343-4287-8B81-0C702673DE5E}" dt="2025-04-21T01:51:55.040" v="1819"/>
-          <ac:inkMkLst>
-            <pc:docMk/>
-            <pc:sldMk cId="786756272" sldId="263"/>
-            <ac:inkMk id="11" creationId="{BD574EF2-2AA6-6785-53D1-B3EB327E7888}"/>
-          </ac:inkMkLst>
-        </pc:inkChg>
-        <pc:inkChg chg="mod">
-          <ac:chgData name="Weifeng Xu" userId="e7aed605-a3dd-4d5a-a692-a87037af107b" providerId="ADAL" clId="{9C06CBEB-0343-4287-8B81-0C702673DE5E}" dt="2025-04-21T01:53:52.417" v="1850" actId="14100"/>
-          <ac:inkMkLst>
-            <pc:docMk/>
-            <pc:sldMk cId="786756272" sldId="263"/>
-            <ac:inkMk id="12" creationId="{52E60A14-4426-EC03-5150-36CCEFA00F6C}"/>
-          </ac:inkMkLst>
-        </pc:inkChg>
       </pc:sldChg>
       <pc:sldChg chg="addSp delSp modSp new mod modClrScheme chgLayout">
         <pc:chgData name="Weifeng Xu" userId="e7aed605-a3dd-4d5a-a692-a87037af107b" providerId="ADAL" clId="{9C06CBEB-0343-4287-8B81-0C702673DE5E}" dt="2025-04-26T19:34:19.596" v="4735" actId="14100"/>
@@ -607,54 +223,6 @@
           <pc:docMk/>
           <pc:sldMk cId="3548515090" sldId="264"/>
         </pc:sldMkLst>
-        <pc:spChg chg="add mod ord">
-          <ac:chgData name="Weifeng Xu" userId="e7aed605-a3dd-4d5a-a692-a87037af107b" providerId="ADAL" clId="{9C06CBEB-0343-4287-8B81-0C702673DE5E}" dt="2025-04-23T00:42:08.933" v="4070" actId="108"/>
-          <ac:spMkLst>
-            <pc:docMk/>
-            <pc:sldMk cId="3548515090" sldId="264"/>
-            <ac:spMk id="2" creationId="{E1B3C761-FCDE-CB83-9B9B-DF88947633D7}"/>
-          </ac:spMkLst>
-        </pc:spChg>
-        <pc:spChg chg="add mod">
-          <ac:chgData name="Weifeng Xu" userId="e7aed605-a3dd-4d5a-a692-a87037af107b" providerId="ADAL" clId="{9C06CBEB-0343-4287-8B81-0C702673DE5E}" dt="2025-04-23T00:28:07.356" v="3740" actId="20577"/>
-          <ac:spMkLst>
-            <pc:docMk/>
-            <pc:sldMk cId="3548515090" sldId="264"/>
-            <ac:spMk id="3" creationId="{A5D594D4-1B6F-8C8E-245D-ED539B52E659}"/>
-          </ac:spMkLst>
-        </pc:spChg>
-        <pc:spChg chg="add mod">
-          <ac:chgData name="Weifeng Xu" userId="e7aed605-a3dd-4d5a-a692-a87037af107b" providerId="ADAL" clId="{9C06CBEB-0343-4287-8B81-0C702673DE5E}" dt="2025-04-26T19:34:19.596" v="4735" actId="14100"/>
-          <ac:spMkLst>
-            <pc:docMk/>
-            <pc:sldMk cId="3548515090" sldId="264"/>
-            <ac:spMk id="5" creationId="{CAB9D21E-EFF2-4A3F-38BB-5AA247529416}"/>
-          </ac:spMkLst>
-        </pc:spChg>
-        <pc:spChg chg="add mod">
-          <ac:chgData name="Weifeng Xu" userId="e7aed605-a3dd-4d5a-a692-a87037af107b" providerId="ADAL" clId="{9C06CBEB-0343-4287-8B81-0C702673DE5E}" dt="2025-04-26T19:34:14.987" v="4734" actId="14100"/>
-          <ac:spMkLst>
-            <pc:docMk/>
-            <pc:sldMk cId="3548515090" sldId="264"/>
-            <ac:spMk id="7" creationId="{997B94E9-2A16-94A9-FFE4-59E420059F4F}"/>
-          </ac:spMkLst>
-        </pc:spChg>
-        <pc:picChg chg="add mod">
-          <ac:chgData name="Weifeng Xu" userId="e7aed605-a3dd-4d5a-a692-a87037af107b" providerId="ADAL" clId="{9C06CBEB-0343-4287-8B81-0C702673DE5E}" dt="2025-04-23T00:27:38.129" v="3711" actId="1076"/>
-          <ac:picMkLst>
-            <pc:docMk/>
-            <pc:sldMk cId="3548515090" sldId="264"/>
-            <ac:picMk id="4" creationId="{880BB6A8-7B18-4E99-A12E-336734E30BAD}"/>
-          </ac:picMkLst>
-        </pc:picChg>
-        <pc:cxnChg chg="add mod">
-          <ac:chgData name="Weifeng Xu" userId="e7aed605-a3dd-4d5a-a692-a87037af107b" providerId="ADAL" clId="{9C06CBEB-0343-4287-8B81-0C702673DE5E}" dt="2025-04-23T00:28:28.109" v="3744" actId="14100"/>
-          <ac:cxnSpMkLst>
-            <pc:docMk/>
-            <pc:sldMk cId="3548515090" sldId="264"/>
-            <ac:cxnSpMk id="6" creationId="{F3E5CD7F-61F0-833A-D245-6401D2618603}"/>
-          </ac:cxnSpMkLst>
-        </pc:cxnChg>
       </pc:sldChg>
       <pc:sldChg chg="addSp delSp modSp new del mod modClrScheme chgLayout modNotesTx">
         <pc:chgData name="Weifeng Xu" userId="e7aed605-a3dd-4d5a-a692-a87037af107b" providerId="ADAL" clId="{9C06CBEB-0343-4287-8B81-0C702673DE5E}" dt="2025-04-26T15:25:29.639" v="4555" actId="47"/>
@@ -669,22 +237,6 @@
           <pc:docMk/>
           <pc:sldMk cId="3828360452" sldId="265"/>
         </pc:sldMkLst>
-        <pc:spChg chg="mod">
-          <ac:chgData name="Weifeng Xu" userId="e7aed605-a3dd-4d5a-a692-a87037af107b" providerId="ADAL" clId="{9C06CBEB-0343-4287-8B81-0C702673DE5E}" dt="2025-04-26T15:32:41.869" v="4619" actId="20577"/>
-          <ac:spMkLst>
-            <pc:docMk/>
-            <pc:sldMk cId="3828360452" sldId="265"/>
-            <ac:spMk id="2" creationId="{CF294B6C-1A47-0389-239C-D59AD2AC1905}"/>
-          </ac:spMkLst>
-        </pc:spChg>
-        <pc:picChg chg="add mod">
-          <ac:chgData name="Weifeng Xu" userId="e7aed605-a3dd-4d5a-a692-a87037af107b" providerId="ADAL" clId="{9C06CBEB-0343-4287-8B81-0C702673DE5E}" dt="2025-04-26T15:32:10.549" v="4606" actId="1076"/>
-          <ac:picMkLst>
-            <pc:docMk/>
-            <pc:sldMk cId="3828360452" sldId="265"/>
-            <ac:picMk id="4" creationId="{13D84251-17B9-C64B-2A7E-03A3089815F1}"/>
-          </ac:picMkLst>
-        </pc:picChg>
       </pc:sldChg>
       <pc:sldChg chg="addSp delSp modSp new del mod ord modClrScheme chgLayout">
         <pc:chgData name="Weifeng Xu" userId="e7aed605-a3dd-4d5a-a692-a87037af107b" providerId="ADAL" clId="{9C06CBEB-0343-4287-8B81-0C702673DE5E}" dt="2025-04-26T15:25:29.639" v="4555" actId="47"/>
@@ -764,15 +316,6 @@
             <pc:sldMasterMk cId="813574162" sldId="2147483648"/>
             <pc:sldLayoutMk cId="821171414" sldId="2147483649"/>
           </pc:sldLayoutMkLst>
-          <pc:spChg chg="add del mod">
-            <ac:chgData name="Weifeng Xu" userId="e7aed605-a3dd-4d5a-a692-a87037af107b" providerId="ADAL" clId="{E34D94EB-D766-41A9-93D0-B8D12317CF67}" dt="2025-04-19T02:11:54.327" v="3" actId="1076"/>
-            <ac:spMkLst>
-              <pc:docMk/>
-              <pc:sldMasterMk cId="813574162" sldId="2147483648"/>
-              <pc:sldLayoutMk cId="821171414" sldId="2147483649"/>
-              <ac:spMk id="4" creationId="{00000000-0000-0000-0000-000000000000}"/>
-            </ac:spMkLst>
-          </pc:spChg>
         </pc:sldLayoutChg>
         <pc:sldLayoutChg chg="setBg">
           <pc:chgData name="Weifeng Xu" userId="e7aed605-a3dd-4d5a-a692-a87037af107b" providerId="ADAL" clId="{E34D94EB-D766-41A9-93D0-B8D12317CF67}" dt="2025-04-19T02:39:28.427" v="133"/>
@@ -1653,7 +1196,7 @@
           <a:p>
             <a:fld id="{2A59A54D-A59E-4D85-AEC9-D5AFF867AB55}" type="datetimeFigureOut">
               <a:rPr lang="en-US" smtClean="0"/>
-              <a:t>5/14/2025</a:t>
+              <a:t>9/14/2025</a:t>
             </a:fld>
             <a:endParaRPr lang="en-US"/>
           </a:p>
@@ -2049,7 +1592,7 @@
           <a:p>
             <a:fld id="{4263717A-E3C1-4BED-ABE0-B7069385E023}" type="datetimeFigureOut">
               <a:rPr lang="en-US" smtClean="0"/>
-              <a:t>5/14/2025</a:t>
+              <a:t>9/14/2025</a:t>
             </a:fld>
             <a:endParaRPr lang="en-US"/>
           </a:p>
@@ -2222,7 +1765,7 @@
           <a:p>
             <a:fld id="{4263717A-E3C1-4BED-ABE0-B7069385E023}" type="datetimeFigureOut">
               <a:rPr lang="en-US" smtClean="0"/>
-              <a:t>5/14/2025</a:t>
+              <a:t>9/14/2025</a:t>
             </a:fld>
             <a:endParaRPr lang="en-US"/>
           </a:p>
@@ -2400,7 +1943,7 @@
           <a:p>
             <a:fld id="{4263717A-E3C1-4BED-ABE0-B7069385E023}" type="datetimeFigureOut">
               <a:rPr lang="en-US" smtClean="0"/>
-              <a:t>5/14/2025</a:t>
+              <a:t>9/14/2025</a:t>
             </a:fld>
             <a:endParaRPr lang="en-US"/>
           </a:p>
@@ -2568,7 +2111,7 @@
           <a:p>
             <a:fld id="{4263717A-E3C1-4BED-ABE0-B7069385E023}" type="datetimeFigureOut">
               <a:rPr lang="en-US" smtClean="0"/>
-              <a:t>5/14/2025</a:t>
+              <a:t>9/14/2025</a:t>
             </a:fld>
             <a:endParaRPr lang="en-US"/>
           </a:p>
@@ -2813,7 +2356,7 @@
           <a:p>
             <a:fld id="{4263717A-E3C1-4BED-ABE0-B7069385E023}" type="datetimeFigureOut">
               <a:rPr lang="en-US" smtClean="0"/>
-              <a:t>5/14/2025</a:t>
+              <a:t>9/14/2025</a:t>
             </a:fld>
             <a:endParaRPr lang="en-US"/>
           </a:p>
@@ -3042,7 +2585,7 @@
           <a:p>
             <a:fld id="{4263717A-E3C1-4BED-ABE0-B7069385E023}" type="datetimeFigureOut">
               <a:rPr lang="en-US" smtClean="0"/>
-              <a:t>5/14/2025</a:t>
+              <a:t>9/14/2025</a:t>
             </a:fld>
             <a:endParaRPr lang="en-US"/>
           </a:p>
@@ -3406,7 +2949,7 @@
           <a:p>
             <a:fld id="{4263717A-E3C1-4BED-ABE0-B7069385E023}" type="datetimeFigureOut">
               <a:rPr lang="en-US" smtClean="0"/>
-              <a:t>5/14/2025</a:t>
+              <a:t>9/14/2025</a:t>
             </a:fld>
             <a:endParaRPr lang="en-US"/>
           </a:p>
@@ -3523,7 +3066,7 @@
           <a:p>
             <a:fld id="{4263717A-E3C1-4BED-ABE0-B7069385E023}" type="datetimeFigureOut">
               <a:rPr lang="en-US" smtClean="0"/>
-              <a:t>5/14/2025</a:t>
+              <a:t>9/14/2025</a:t>
             </a:fld>
             <a:endParaRPr lang="en-US"/>
           </a:p>
@@ -3618,7 +3161,7 @@
           <a:p>
             <a:fld id="{4263717A-E3C1-4BED-ABE0-B7069385E023}" type="datetimeFigureOut">
               <a:rPr lang="en-US" smtClean="0"/>
-              <a:t>5/14/2025</a:t>
+              <a:t>9/14/2025</a:t>
             </a:fld>
             <a:endParaRPr lang="en-US"/>
           </a:p>
@@ -3893,7 +3436,7 @@
           <a:p>
             <a:fld id="{4263717A-E3C1-4BED-ABE0-B7069385E023}" type="datetimeFigureOut">
               <a:rPr lang="en-US" smtClean="0"/>
-              <a:t>5/14/2025</a:t>
+              <a:t>9/14/2025</a:t>
             </a:fld>
             <a:endParaRPr lang="en-US"/>
           </a:p>
@@ -4145,7 +3688,7 @@
           <a:p>
             <a:fld id="{4263717A-E3C1-4BED-ABE0-B7069385E023}" type="datetimeFigureOut">
               <a:rPr lang="en-US" smtClean="0"/>
-              <a:t>5/14/2025</a:t>
+              <a:t>9/14/2025</a:t>
             </a:fld>
             <a:endParaRPr lang="en-US"/>
           </a:p>
@@ -4364,7 +3907,7 @@
           <a:p>
             <a:fld id="{4263717A-E3C1-4BED-ABE0-B7069385E023}" type="datetimeFigureOut">
               <a:rPr lang="en-US" smtClean="0"/>
-              <a:t>5/14/2025</a:t>
+              <a:t>9/14/2025</a:t>
             </a:fld>
             <a:endParaRPr lang="en-US"/>
           </a:p>
@@ -7574,35 +7117,7 @@
                 <a:latin typeface="Arial" panose="020B0604020202020204" pitchFamily="34" charset="0"/>
                 <a:ea typeface="__Public_Sans_2c154e"/>
               </a:rPr>
-              <a:t>Mean </a:t>
-            </a:r>
-            <a:r>
-              <a:rPr kumimoji="0" lang="en-US" altLang="en-US" sz="2000" b="1" i="0" u="none" strike="noStrike" cap="none" normalizeH="0" baseline="0" dirty="0" err="1">
-                <a:ln>
-                  <a:noFill/>
-                </a:ln>
-                <a:solidFill>
-                  <a:srgbClr val="475467"/>
-                </a:solidFill>
-                <a:effectLst/>
-                <a:latin typeface="Arial" panose="020B0604020202020204" pitchFamily="34" charset="0"/>
-                <a:ea typeface="__Public_Sans_2c154e"/>
-              </a:rPr>
-              <a:t>squar</a:t>
-            </a:r>
-            <a:r>
-              <a:rPr kumimoji="0" lang="en-US" altLang="en-US" sz="2000" b="1" i="0" u="none" strike="noStrike" cap="none" normalizeH="0" baseline="0" dirty="0">
-                <a:ln>
-                  <a:noFill/>
-                </a:ln>
-                <a:solidFill>
-                  <a:srgbClr val="475467"/>
-                </a:solidFill>
-                <a:effectLst/>
-                <a:latin typeface="Arial" panose="020B0604020202020204" pitchFamily="34" charset="0"/>
-                <a:ea typeface="__Public_Sans_2c154e"/>
-              </a:rPr>
-              <a:t> errors</a:t>
+              <a:t>Mean square errors</a:t>
             </a:r>
             <a:r>
               <a:rPr kumimoji="0" lang="en-US" altLang="en-US" sz="2000" b="0" i="0" u="none" strike="noStrike" cap="none" normalizeH="0" baseline="0" dirty="0">

</xml_diff>